<commit_message>
-added and updated diagrams
</commit_message>
<xml_diff>
--- a/docs/diagrams/AppointmentClassDiagram.pptx
+++ b/docs/diagrams/AppointmentClassDiagram.pptx
@@ -104,6 +104,11 @@
       </a:defRPr>
     </a:lvl9pPr>
   </p:defaultTextStyle>
+  <p:extLst>
+    <p:ext uri="{EFAFB233-063F-42B5-8137-9DF3F51BA10A}">
+      <p15:sldGuideLst xmlns:p15="http://schemas.microsoft.com/office/powerpoint/2012/main"/>
+    </p:ext>
+  </p:extLst>
 </p:presentation>
 </file>
 
@@ -260,7 +265,7 @@
           <a:p>
             <a:fld id="{1919B048-43FD-4327-8BD0-A5AA703C8835}" type="datetimeFigureOut">
               <a:rPr lang="en-GB" smtClean="0"/>
-              <a:t>10/04/2018</a:t>
+              <a:t>12/04/2018</a:t>
             </a:fld>
             <a:endParaRPr lang="en-GB"/>
           </a:p>
@@ -460,7 +465,7 @@
           <a:p>
             <a:fld id="{1919B048-43FD-4327-8BD0-A5AA703C8835}" type="datetimeFigureOut">
               <a:rPr lang="en-GB" smtClean="0"/>
-              <a:t>10/04/2018</a:t>
+              <a:t>12/04/2018</a:t>
             </a:fld>
             <a:endParaRPr lang="en-GB"/>
           </a:p>
@@ -670,7 +675,7 @@
           <a:p>
             <a:fld id="{1919B048-43FD-4327-8BD0-A5AA703C8835}" type="datetimeFigureOut">
               <a:rPr lang="en-GB" smtClean="0"/>
-              <a:t>10/04/2018</a:t>
+              <a:t>12/04/2018</a:t>
             </a:fld>
             <a:endParaRPr lang="en-GB"/>
           </a:p>
@@ -870,7 +875,7 @@
           <a:p>
             <a:fld id="{1919B048-43FD-4327-8BD0-A5AA703C8835}" type="datetimeFigureOut">
               <a:rPr lang="en-GB" smtClean="0"/>
-              <a:t>10/04/2018</a:t>
+              <a:t>12/04/2018</a:t>
             </a:fld>
             <a:endParaRPr lang="en-GB"/>
           </a:p>
@@ -1146,7 +1151,7 @@
           <a:p>
             <a:fld id="{1919B048-43FD-4327-8BD0-A5AA703C8835}" type="datetimeFigureOut">
               <a:rPr lang="en-GB" smtClean="0"/>
-              <a:t>10/04/2018</a:t>
+              <a:t>12/04/2018</a:t>
             </a:fld>
             <a:endParaRPr lang="en-GB"/>
           </a:p>
@@ -1414,7 +1419,7 @@
           <a:p>
             <a:fld id="{1919B048-43FD-4327-8BD0-A5AA703C8835}" type="datetimeFigureOut">
               <a:rPr lang="en-GB" smtClean="0"/>
-              <a:t>10/04/2018</a:t>
+              <a:t>12/04/2018</a:t>
             </a:fld>
             <a:endParaRPr lang="en-GB"/>
           </a:p>
@@ -1829,7 +1834,7 @@
           <a:p>
             <a:fld id="{1919B048-43FD-4327-8BD0-A5AA703C8835}" type="datetimeFigureOut">
               <a:rPr lang="en-GB" smtClean="0"/>
-              <a:t>10/04/2018</a:t>
+              <a:t>12/04/2018</a:t>
             </a:fld>
             <a:endParaRPr lang="en-GB"/>
           </a:p>
@@ -1971,7 +1976,7 @@
           <a:p>
             <a:fld id="{1919B048-43FD-4327-8BD0-A5AA703C8835}" type="datetimeFigureOut">
               <a:rPr lang="en-GB" smtClean="0"/>
-              <a:t>10/04/2018</a:t>
+              <a:t>12/04/2018</a:t>
             </a:fld>
             <a:endParaRPr lang="en-GB"/>
           </a:p>
@@ -2084,7 +2089,7 @@
           <a:p>
             <a:fld id="{1919B048-43FD-4327-8BD0-A5AA703C8835}" type="datetimeFigureOut">
               <a:rPr lang="en-GB" smtClean="0"/>
-              <a:t>10/04/2018</a:t>
+              <a:t>12/04/2018</a:t>
             </a:fld>
             <a:endParaRPr lang="en-GB"/>
           </a:p>
@@ -2397,7 +2402,7 @@
           <a:p>
             <a:fld id="{1919B048-43FD-4327-8BD0-A5AA703C8835}" type="datetimeFigureOut">
               <a:rPr lang="en-GB" smtClean="0"/>
-              <a:t>10/04/2018</a:t>
+              <a:t>12/04/2018</a:t>
             </a:fld>
             <a:endParaRPr lang="en-GB"/>
           </a:p>
@@ -2686,7 +2691,7 @@
           <a:p>
             <a:fld id="{1919B048-43FD-4327-8BD0-A5AA703C8835}" type="datetimeFigureOut">
               <a:rPr lang="en-GB" smtClean="0"/>
-              <a:t>10/04/2018</a:t>
+              <a:t>12/04/2018</a:t>
             </a:fld>
             <a:endParaRPr lang="en-GB"/>
           </a:p>
@@ -2929,7 +2934,7 @@
           <a:p>
             <a:fld id="{1919B048-43FD-4327-8BD0-A5AA703C8835}" type="datetimeFigureOut">
               <a:rPr lang="en-GB" smtClean="0"/>
-              <a:t>10/04/2018</a:t>
+              <a:t>12/04/2018</a:t>
             </a:fld>
             <a:endParaRPr lang="en-GB"/>
           </a:p>
@@ -4377,6 +4382,211 @@
           </a:p>
         </p:txBody>
       </p:sp>
+      <p:sp>
+        <p:nvSpPr>
+          <p:cNvPr id="2" name="TextBox 1">
+            <a:extLst>
+              <a:ext uri="{FF2B5EF4-FFF2-40B4-BE49-F238E27FC236}">
+                <a16:creationId xmlns:a16="http://schemas.microsoft.com/office/drawing/2014/main" id="{6886CE0F-C63B-4A38-A4A5-4FCC8F6E96A8}"/>
+              </a:ext>
+            </a:extLst>
+          </p:cNvPr>
+          <p:cNvSpPr txBox="1"/>
+          <p:nvPr/>
+        </p:nvSpPr>
+        <p:spPr>
+          <a:xfrm>
+            <a:off x="4962615" y="544495"/>
+            <a:ext cx="170151" cy="369332"/>
+          </a:xfrm>
+          <a:prstGeom prst="rect">
+            <a:avLst/>
+          </a:prstGeom>
+          <a:noFill/>
+        </p:spPr>
+        <p:txBody>
+          <a:bodyPr wrap="square" rtlCol="0">
+            <a:spAutoFit/>
+          </a:bodyPr>
+          <a:lstStyle/>
+          <a:p>
+            <a:r>
+              <a:rPr lang="en-GB" dirty="0">
+                <a:solidFill>
+                  <a:schemeClr val="accent2">
+                    <a:lumMod val="50000"/>
+                  </a:schemeClr>
+                </a:solidFill>
+              </a:rPr>
+              <a:t>1</a:t>
+            </a:r>
+          </a:p>
+        </p:txBody>
+      </p:sp>
+      <p:sp>
+        <p:nvSpPr>
+          <p:cNvPr id="21" name="TextBox 20">
+            <a:extLst>
+              <a:ext uri="{FF2B5EF4-FFF2-40B4-BE49-F238E27FC236}">
+                <a16:creationId xmlns:a16="http://schemas.microsoft.com/office/drawing/2014/main" id="{F773AB2D-D389-481B-8E6D-09193195FEC5}"/>
+              </a:ext>
+            </a:extLst>
+          </p:cNvPr>
+          <p:cNvSpPr txBox="1"/>
+          <p:nvPr/>
+        </p:nvSpPr>
+        <p:spPr>
+          <a:xfrm>
+            <a:off x="4962614" y="1403246"/>
+            <a:ext cx="170151" cy="369332"/>
+          </a:xfrm>
+          <a:prstGeom prst="rect">
+            <a:avLst/>
+          </a:prstGeom>
+          <a:noFill/>
+        </p:spPr>
+        <p:txBody>
+          <a:bodyPr wrap="square" rtlCol="0">
+            <a:spAutoFit/>
+          </a:bodyPr>
+          <a:lstStyle/>
+          <a:p>
+            <a:r>
+              <a:rPr lang="en-GB" dirty="0">
+                <a:solidFill>
+                  <a:schemeClr val="accent2">
+                    <a:lumMod val="50000"/>
+                  </a:schemeClr>
+                </a:solidFill>
+              </a:rPr>
+              <a:t>1</a:t>
+            </a:r>
+          </a:p>
+        </p:txBody>
+      </p:sp>
+      <p:sp>
+        <p:nvSpPr>
+          <p:cNvPr id="22" name="TextBox 21">
+            <a:extLst>
+              <a:ext uri="{FF2B5EF4-FFF2-40B4-BE49-F238E27FC236}">
+                <a16:creationId xmlns:a16="http://schemas.microsoft.com/office/drawing/2014/main" id="{E4BA3E9D-AC95-458D-9C0D-5EF73A020E4E}"/>
+              </a:ext>
+            </a:extLst>
+          </p:cNvPr>
+          <p:cNvSpPr txBox="1"/>
+          <p:nvPr/>
+        </p:nvSpPr>
+        <p:spPr>
+          <a:xfrm>
+            <a:off x="4965954" y="2252452"/>
+            <a:ext cx="170151" cy="369332"/>
+          </a:xfrm>
+          <a:prstGeom prst="rect">
+            <a:avLst/>
+          </a:prstGeom>
+          <a:noFill/>
+        </p:spPr>
+        <p:txBody>
+          <a:bodyPr wrap="square" rtlCol="0">
+            <a:spAutoFit/>
+          </a:bodyPr>
+          <a:lstStyle/>
+          <a:p>
+            <a:r>
+              <a:rPr lang="en-GB" dirty="0">
+                <a:solidFill>
+                  <a:schemeClr val="accent2">
+                    <a:lumMod val="50000"/>
+                  </a:schemeClr>
+                </a:solidFill>
+              </a:rPr>
+              <a:t>1</a:t>
+            </a:r>
+          </a:p>
+        </p:txBody>
+      </p:sp>
+      <p:sp>
+        <p:nvSpPr>
+          <p:cNvPr id="23" name="TextBox 22">
+            <a:extLst>
+              <a:ext uri="{FF2B5EF4-FFF2-40B4-BE49-F238E27FC236}">
+                <a16:creationId xmlns:a16="http://schemas.microsoft.com/office/drawing/2014/main" id="{86F61661-006A-45D8-926D-DE2A6E8E1BF1}"/>
+              </a:ext>
+            </a:extLst>
+          </p:cNvPr>
+          <p:cNvSpPr txBox="1"/>
+          <p:nvPr/>
+        </p:nvSpPr>
+        <p:spPr>
+          <a:xfrm>
+            <a:off x="4962614" y="3096859"/>
+            <a:ext cx="170151" cy="369332"/>
+          </a:xfrm>
+          <a:prstGeom prst="rect">
+            <a:avLst/>
+          </a:prstGeom>
+          <a:noFill/>
+        </p:spPr>
+        <p:txBody>
+          <a:bodyPr wrap="square" rtlCol="0">
+            <a:spAutoFit/>
+          </a:bodyPr>
+          <a:lstStyle/>
+          <a:p>
+            <a:r>
+              <a:rPr lang="en-GB" dirty="0">
+                <a:solidFill>
+                  <a:schemeClr val="accent2">
+                    <a:lumMod val="50000"/>
+                  </a:schemeClr>
+                </a:solidFill>
+              </a:rPr>
+              <a:t>1</a:t>
+            </a:r>
+          </a:p>
+        </p:txBody>
+      </p:sp>
+      <p:sp>
+        <p:nvSpPr>
+          <p:cNvPr id="24" name="TextBox 23">
+            <a:extLst>
+              <a:ext uri="{FF2B5EF4-FFF2-40B4-BE49-F238E27FC236}">
+                <a16:creationId xmlns:a16="http://schemas.microsoft.com/office/drawing/2014/main" id="{8443A3F1-9682-4190-AFE8-77B09D43A7A3}"/>
+              </a:ext>
+            </a:extLst>
+          </p:cNvPr>
+          <p:cNvSpPr txBox="1"/>
+          <p:nvPr/>
+        </p:nvSpPr>
+        <p:spPr>
+          <a:xfrm>
+            <a:off x="4958178" y="4004797"/>
+            <a:ext cx="170151" cy="369332"/>
+          </a:xfrm>
+          <a:prstGeom prst="rect">
+            <a:avLst/>
+          </a:prstGeom>
+          <a:noFill/>
+        </p:spPr>
+        <p:txBody>
+          <a:bodyPr wrap="square" rtlCol="0">
+            <a:spAutoFit/>
+          </a:bodyPr>
+          <a:lstStyle/>
+          <a:p>
+            <a:r>
+              <a:rPr lang="en-GB" dirty="0">
+                <a:solidFill>
+                  <a:schemeClr val="accent2">
+                    <a:lumMod val="50000"/>
+                  </a:schemeClr>
+                </a:solidFill>
+              </a:rPr>
+              <a:t>1</a:t>
+            </a:r>
+          </a:p>
+        </p:txBody>
+      </p:sp>
     </p:spTree>
     <p:extLst>
       <p:ext uri="{BB962C8B-B14F-4D97-AF65-F5344CB8AC3E}">

</xml_diff>